<commit_message>
oox smartart, accent process: handle multiple runs from a data point
Multiple paragraphs indeed are impossible for those containers, but
multiple runs can happen.

Change-Id: I47a2f72cae4cbb822f31a5b7cd0169a663e2a6a8
Reviewed-on: https://gerrit.libreoffice.org/63732
Reviewed-by: Miklos Vajna <vmiklos@collabora.com>
Tested-by: Jenkins
</commit_message>
<xml_diff>
--- a/sd/qa/unit/data/pptx/smartart-accent-process.pptx
+++ b/sd/qa/unit/data/pptx/smartart-accent-process.pptx
@@ -949,6 +949,10 @@
         <a:bodyPr/>
         <a:lstStyle/>
         <a:p>
+          <a:r>
+            <a:rPr lang="en-US" dirty="0" smtClean="0"/>
+            <a:t>c</a:t>
+          </a:r>
           <a:r>
             <a:rPr lang="en-US" dirty="0" smtClean="0"/>
             <a:t>c</a:t>

</xml_diff>